<commit_message>
Final changes to summer slides
</commit_message>
<xml_diff>
--- a/Slides/MiCM_GitHub_Workshop_Summer24.pptx
+++ b/Slides/MiCM_GitHub_Workshop_Summer24.pptx
@@ -201,7 +201,7 @@
 <file path=ppt/revisionInfo.xml><?xml version="1.0" encoding="utf-8"?>
 <p1510:revInfo xmlns:a="http://schemas.openxmlformats.org/drawingml/2006/main" xmlns:r="http://schemas.openxmlformats.org/officeDocument/2006/relationships" xmlns:p1510="http://schemas.microsoft.com/office/powerpoint/2015/10/main">
   <p1510:revLst>
-    <p1510:client id="{03CCF045-E3F0-4C0B-99C0-AE5DE6B41DEC}" v="3" dt="2024-07-12T04:08:27.306"/>
+    <p1510:client id="{03CCF045-E3F0-4C0B-99C0-AE5DE6B41DEC}" v="6" dt="2024-07-12T16:33:54.530"/>
   </p1510:revLst>
 </p1510:revInfo>
 </file>
@@ -2362,7 +2362,7 @@
   <pc:docChgLst>
     <pc:chgData name="Adrien Osakwe" userId="7a3e290c-eb83-484b-8e3d-d46ef2333477" providerId="ADAL" clId="{03CCF045-E3F0-4C0B-99C0-AE5DE6B41DEC}"/>
     <pc:docChg chg="custSel modSld">
-      <pc:chgData name="Adrien Osakwe" userId="7a3e290c-eb83-484b-8e3d-d46ef2333477" providerId="ADAL" clId="{03CCF045-E3F0-4C0B-99C0-AE5DE6B41DEC}" dt="2024-07-12T04:08:27.264" v="267" actId="20577"/>
+      <pc:chgData name="Adrien Osakwe" userId="7a3e290c-eb83-484b-8e3d-d46ef2333477" providerId="ADAL" clId="{03CCF045-E3F0-4C0B-99C0-AE5DE6B41DEC}" dt="2024-07-12T19:45:51.572" v="442" actId="20577"/>
       <pc:docMkLst>
         <pc:docMk/>
       </pc:docMkLst>
@@ -2396,6 +2396,28 @@
           </ac:spMkLst>
         </pc:spChg>
       </pc:sldChg>
+      <pc:sldChg chg="modSp mod">
+        <pc:chgData name="Adrien Osakwe" userId="7a3e290c-eb83-484b-8e3d-d46ef2333477" providerId="ADAL" clId="{03CCF045-E3F0-4C0B-99C0-AE5DE6B41DEC}" dt="2024-07-12T19:06:30.296" v="276" actId="403"/>
+        <pc:sldMkLst>
+          <pc:docMk/>
+          <pc:sldMk cId="1411733175" sldId="380"/>
+        </pc:sldMkLst>
+        <pc:spChg chg="mod">
+          <ac:chgData name="Adrien Osakwe" userId="7a3e290c-eb83-484b-8e3d-d46ef2333477" providerId="ADAL" clId="{03CCF045-E3F0-4C0B-99C0-AE5DE6B41DEC}" dt="2024-07-12T19:06:30.296" v="276" actId="403"/>
+          <ac:spMkLst>
+            <pc:docMk/>
+            <pc:sldMk cId="1411733175" sldId="380"/>
+            <ac:spMk id="2" creationId="{F30F071A-0450-8F6E-F28D-8124D7A90523}"/>
+          </ac:spMkLst>
+        </pc:spChg>
+      </pc:sldChg>
+      <pc:sldChg chg="modAnim">
+        <pc:chgData name="Adrien Osakwe" userId="7a3e290c-eb83-484b-8e3d-d46ef2333477" providerId="ADAL" clId="{03CCF045-E3F0-4C0B-99C0-AE5DE6B41DEC}" dt="2024-07-12T16:33:54.530" v="270"/>
+        <pc:sldMkLst>
+          <pc:docMk/>
+          <pc:sldMk cId="1245366370" sldId="381"/>
+        </pc:sldMkLst>
+      </pc:sldChg>
       <pc:sldChg chg="addSp delSp modSp mod">
         <pc:chgData name="Adrien Osakwe" userId="7a3e290c-eb83-484b-8e3d-d46ef2333477" providerId="ADAL" clId="{03CCF045-E3F0-4C0B-99C0-AE5DE6B41DEC}" dt="2024-07-11T18:05:45.354" v="21" actId="1076"/>
         <pc:sldMkLst>
@@ -2450,14 +2472,14 @@
           </ac:picMkLst>
         </pc:picChg>
       </pc:sldChg>
-      <pc:sldChg chg="modSp mod">
-        <pc:chgData name="Adrien Osakwe" userId="7a3e290c-eb83-484b-8e3d-d46ef2333477" providerId="ADAL" clId="{03CCF045-E3F0-4C0B-99C0-AE5DE6B41DEC}" dt="2024-07-12T04:08:27.264" v="267" actId="20577"/>
+      <pc:sldChg chg="modSp mod modNotesTx">
+        <pc:chgData name="Adrien Osakwe" userId="7a3e290c-eb83-484b-8e3d-d46ef2333477" providerId="ADAL" clId="{03CCF045-E3F0-4C0B-99C0-AE5DE6B41DEC}" dt="2024-07-12T19:45:51.572" v="442" actId="20577"/>
         <pc:sldMkLst>
           <pc:docMk/>
           <pc:sldMk cId="1071182491" sldId="401"/>
         </pc:sldMkLst>
         <pc:spChg chg="mod">
-          <ac:chgData name="Adrien Osakwe" userId="7a3e290c-eb83-484b-8e3d-d46ef2333477" providerId="ADAL" clId="{03CCF045-E3F0-4C0B-99C0-AE5DE6B41DEC}" dt="2024-07-12T04:08:27.264" v="267" actId="20577"/>
+          <ac:chgData name="Adrien Osakwe" userId="7a3e290c-eb83-484b-8e3d-d46ef2333477" providerId="ADAL" clId="{03CCF045-E3F0-4C0B-99C0-AE5DE6B41DEC}" dt="2024-07-12T19:45:09.601" v="361" actId="20577"/>
           <ac:spMkLst>
             <pc:docMk/>
             <pc:sldMk cId="1071182491" sldId="401"/>
@@ -5670,7 +5692,7 @@
           <a:p>
             <a:fld id="{217E5156-1B5D-054E-B5B2-E1B1BA160252}" type="datetimeFigureOut">
               <a:rPr lang="fr-FR" smtClean="0"/>
-              <a:t>11/07/2024</a:t>
+              <a:t>12/07/2024</a:t>
             </a:fld>
             <a:endParaRPr lang="fr-FR"/>
           </a:p>
@@ -7427,6 +7449,94 @@
     <p:extLst>
       <p:ext uri="{BB962C8B-B14F-4D97-AF65-F5344CB8AC3E}">
         <p14:creationId xmlns:p14="http://schemas.microsoft.com/office/powerpoint/2010/main" val="2751918341"/>
+      </p:ext>
+    </p:extLst>
+  </p:cSld>
+  <p:clrMapOvr>
+    <a:masterClrMapping/>
+  </p:clrMapOvr>
+</p:notes>
+</file>
+
+<file path=ppt/notesSlides/notesSlide23.xml><?xml version="1.0" encoding="utf-8"?>
+<p:notes xmlns:a="http://schemas.openxmlformats.org/drawingml/2006/main" xmlns:r="http://schemas.openxmlformats.org/officeDocument/2006/relationships" xmlns:p="http://schemas.openxmlformats.org/presentationml/2006/main">
+  <p:cSld>
+    <p:spTree>
+      <p:nvGrpSpPr>
+        <p:cNvPr id="1" name=""/>
+        <p:cNvGrpSpPr/>
+        <p:nvPr/>
+      </p:nvGrpSpPr>
+      <p:grpSpPr>
+        <a:xfrm>
+          <a:off x="0" y="0"/>
+          <a:ext cx="0" cy="0"/>
+          <a:chOff x="0" y="0"/>
+          <a:chExt cx="0" cy="0"/>
+        </a:xfrm>
+      </p:grpSpPr>
+      <p:sp>
+        <p:nvSpPr>
+          <p:cNvPr id="2" name="Slide Image Placeholder 1"/>
+          <p:cNvSpPr>
+            <a:spLocks noGrp="1" noRot="1" noChangeAspect="1"/>
+          </p:cNvSpPr>
+          <p:nvPr>
+            <p:ph type="sldImg"/>
+          </p:nvPr>
+        </p:nvSpPr>
+        <p:spPr/>
+      </p:sp>
+      <p:sp>
+        <p:nvSpPr>
+          <p:cNvPr id="3" name="Notes Placeholder 2"/>
+          <p:cNvSpPr>
+            <a:spLocks noGrp="1"/>
+          </p:cNvSpPr>
+          <p:nvPr>
+            <p:ph type="body" idx="1"/>
+          </p:nvPr>
+        </p:nvSpPr>
+        <p:spPr/>
+        <p:txBody>
+          <a:bodyPr/>
+          <a:lstStyle/>
+          <a:p>
+            <a:r>
+              <a:rPr lang="en-CA" dirty="0"/>
+              <a:t>Note: in future share zip files for projects to reduce fork #</a:t>
+            </a:r>
+            <a:endParaRPr lang="en-US" dirty="0"/>
+          </a:p>
+        </p:txBody>
+      </p:sp>
+      <p:sp>
+        <p:nvSpPr>
+          <p:cNvPr id="4" name="Slide Number Placeholder 3"/>
+          <p:cNvSpPr>
+            <a:spLocks noGrp="1"/>
+          </p:cNvSpPr>
+          <p:nvPr>
+            <p:ph type="sldNum" sz="quarter" idx="5"/>
+          </p:nvPr>
+        </p:nvSpPr>
+        <p:spPr/>
+        <p:txBody>
+          <a:bodyPr/>
+          <a:lstStyle/>
+          <a:p>
+            <a:fld id="{DACBD60B-517C-4242-AE46-E1BD2D086542}" type="slidenum">
+              <a:rPr lang="fr-FR" smtClean="0"/>
+              <a:t>66</a:t>
+            </a:fld>
+            <a:endParaRPr lang="fr-FR"/>
+          </a:p>
+        </p:txBody>
+      </p:sp>
+    </p:spTree>
+    <p:extLst>
+      <p:ext uri="{BB962C8B-B14F-4D97-AF65-F5344CB8AC3E}">
+        <p14:creationId xmlns:p14="http://schemas.microsoft.com/office/powerpoint/2010/main" val="3422166954"/>
       </p:ext>
     </p:extLst>
   </p:cSld>
@@ -12756,6 +12866,183 @@
   <p:clrMapOvr>
     <a:masterClrMapping/>
   </p:clrMapOvr>
+  <p:timing>
+    <p:tnLst>
+      <p:par>
+        <p:cTn id="1" dur="indefinite" restart="never" nodeType="tmRoot">
+          <p:childTnLst>
+            <p:seq concurrent="1" nextAc="seek">
+              <p:cTn id="2" dur="indefinite" nodeType="mainSeq">
+                <p:childTnLst>
+                  <p:par>
+                    <p:cTn id="3" fill="hold">
+                      <p:stCondLst>
+                        <p:cond delay="indefinite"/>
+                      </p:stCondLst>
+                      <p:childTnLst>
+                        <p:par>
+                          <p:cTn id="4" fill="hold">
+                            <p:stCondLst>
+                              <p:cond delay="0"/>
+                            </p:stCondLst>
+                            <p:childTnLst>
+                              <p:par>
+                                <p:cTn id="5" presetID="1" presetClass="entr" presetSubtype="0" fill="hold" nodeType="clickEffect">
+                                  <p:stCondLst>
+                                    <p:cond delay="0"/>
+                                  </p:stCondLst>
+                                  <p:childTnLst>
+                                    <p:set>
+                                      <p:cBhvr>
+                                        <p:cTn id="6" dur="1" fill="hold">
+                                          <p:stCondLst>
+                                            <p:cond delay="0"/>
+                                          </p:stCondLst>
+                                        </p:cTn>
+                                        <p:tgtEl>
+                                          <p:spTgt spid="2">
+                                            <p:txEl>
+                                              <p:pRg st="4" end="4"/>
+                                            </p:txEl>
+                                          </p:spTgt>
+                                        </p:tgtEl>
+                                        <p:attrNameLst>
+                                          <p:attrName>style.visibility</p:attrName>
+                                        </p:attrNameLst>
+                                      </p:cBhvr>
+                                      <p:to>
+                                        <p:strVal val="visible"/>
+                                      </p:to>
+                                    </p:set>
+                                  </p:childTnLst>
+                                </p:cTn>
+                              </p:par>
+                            </p:childTnLst>
+                          </p:cTn>
+                        </p:par>
+                      </p:childTnLst>
+                    </p:cTn>
+                  </p:par>
+                  <p:par>
+                    <p:cTn id="7" fill="hold">
+                      <p:stCondLst>
+                        <p:cond delay="indefinite"/>
+                      </p:stCondLst>
+                      <p:childTnLst>
+                        <p:par>
+                          <p:cTn id="8" fill="hold">
+                            <p:stCondLst>
+                              <p:cond delay="0"/>
+                            </p:stCondLst>
+                            <p:childTnLst>
+                              <p:par>
+                                <p:cTn id="9" presetID="1" presetClass="entr" presetSubtype="0" fill="hold" nodeType="clickEffect">
+                                  <p:stCondLst>
+                                    <p:cond delay="0"/>
+                                  </p:stCondLst>
+                                  <p:childTnLst>
+                                    <p:set>
+                                      <p:cBhvr>
+                                        <p:cTn id="10" dur="1" fill="hold">
+                                          <p:stCondLst>
+                                            <p:cond delay="0"/>
+                                          </p:stCondLst>
+                                        </p:cTn>
+                                        <p:tgtEl>
+                                          <p:spTgt spid="2">
+                                            <p:txEl>
+                                              <p:pRg st="6" end="6"/>
+                                            </p:txEl>
+                                          </p:spTgt>
+                                        </p:tgtEl>
+                                        <p:attrNameLst>
+                                          <p:attrName>style.visibility</p:attrName>
+                                        </p:attrNameLst>
+                                      </p:cBhvr>
+                                      <p:to>
+                                        <p:strVal val="visible"/>
+                                      </p:to>
+                                    </p:set>
+                                  </p:childTnLst>
+                                </p:cTn>
+                              </p:par>
+                            </p:childTnLst>
+                          </p:cTn>
+                        </p:par>
+                      </p:childTnLst>
+                    </p:cTn>
+                  </p:par>
+                  <p:par>
+                    <p:cTn id="11" fill="hold">
+                      <p:stCondLst>
+                        <p:cond delay="indefinite"/>
+                      </p:stCondLst>
+                      <p:childTnLst>
+                        <p:par>
+                          <p:cTn id="12" fill="hold">
+                            <p:stCondLst>
+                              <p:cond delay="0"/>
+                            </p:stCondLst>
+                            <p:childTnLst>
+                              <p:par>
+                                <p:cTn id="13" presetID="1" presetClass="entr" presetSubtype="0" fill="hold" nodeType="clickEffect">
+                                  <p:stCondLst>
+                                    <p:cond delay="0"/>
+                                  </p:stCondLst>
+                                  <p:childTnLst>
+                                    <p:set>
+                                      <p:cBhvr>
+                                        <p:cTn id="14" dur="1" fill="hold">
+                                          <p:stCondLst>
+                                            <p:cond delay="0"/>
+                                          </p:stCondLst>
+                                        </p:cTn>
+                                        <p:tgtEl>
+                                          <p:spTgt spid="2">
+                                            <p:txEl>
+                                              <p:pRg st="8" end="8"/>
+                                            </p:txEl>
+                                          </p:spTgt>
+                                        </p:tgtEl>
+                                        <p:attrNameLst>
+                                          <p:attrName>style.visibility</p:attrName>
+                                        </p:attrNameLst>
+                                      </p:cBhvr>
+                                      <p:to>
+                                        <p:strVal val="visible"/>
+                                      </p:to>
+                                    </p:set>
+                                  </p:childTnLst>
+                                </p:cTn>
+                              </p:par>
+                            </p:childTnLst>
+                          </p:cTn>
+                        </p:par>
+                      </p:childTnLst>
+                    </p:cTn>
+                  </p:par>
+                </p:childTnLst>
+              </p:cTn>
+              <p:prevCondLst>
+                <p:cond evt="onPrev" delay="0">
+                  <p:tgtEl>
+                    <p:sldTgt/>
+                  </p:tgtEl>
+                </p:cond>
+              </p:prevCondLst>
+              <p:nextCondLst>
+                <p:cond evt="onNext" delay="0">
+                  <p:tgtEl>
+                    <p:sldTgt/>
+                  </p:tgtEl>
+                </p:cond>
+              </p:nextCondLst>
+            </p:seq>
+          </p:childTnLst>
+        </p:cTn>
+      </p:par>
+    </p:tnLst>
+  </p:timing>
 </p:sld>
 </file>
 
@@ -29704,7 +29991,7 @@
         <p:spPr/>
         <p:txBody>
           <a:bodyPr>
-            <a:normAutofit fontScale="92500" lnSpcReduction="20000"/>
+            <a:normAutofit fontScale="85000" lnSpcReduction="20000"/>
           </a:bodyPr>
           <a:lstStyle/>
           <a:p>
@@ -29724,6 +30011,16 @@
             <a:r>
               <a:rPr lang="en-CA" dirty="0"/>
               <a:t>Open the link in chat to access the repo I made.</a:t>
+            </a:r>
+          </a:p>
+          <a:p>
+            <a:pPr marL="971438" lvl="1" indent="-514350">
+              <a:buFont typeface="+mj-lt"/>
+              <a:buAutoNum type="arabicPeriod"/>
+            </a:pPr>
+            <a:r>
+              <a:rPr lang="en-CA" sz="2800" b="1" dirty="0"/>
+              <a:t>https://github.com/aosakwe/GitHub_Practice</a:t>
             </a:r>
           </a:p>
           <a:p>
@@ -30893,7 +31190,26 @@
               <a:buFont typeface="+mj-lt"/>
               <a:buAutoNum type="arabicPeriod"/>
             </a:pPr>
-            <a:endParaRPr lang="en-CA" dirty="0"/>
+            <a:r>
+              <a:rPr lang="en-CA" dirty="0"/>
+              <a:t>Activities (Data Analysis // Database curation) store in ‘Team Project’ folder for this workshop’s repo.</a:t>
+            </a:r>
+          </a:p>
+          <a:p>
+            <a:pPr marL="971438" lvl="1" indent="-514350">
+              <a:buFont typeface="+mj-lt"/>
+              <a:buAutoNum type="arabicPeriod"/>
+            </a:pPr>
+            <a:r>
+              <a:rPr lang="en-CA" dirty="0">
+                <a:hlinkClick r:id="rId3"/>
+              </a:rPr>
+              <a:t>https://github.com/aosakwe/MiCM_IntroToGitHub</a:t>
+            </a:r>
+            <a:r>
+              <a:rPr lang="en-CA" dirty="0"/>
+              <a:t> </a:t>
+            </a:r>
           </a:p>
           <a:p>
             <a:pPr marL="514350" indent="-514350">
@@ -30902,47 +31218,23 @@
             </a:pPr>
             <a:r>
               <a:rPr lang="en-CA" dirty="0"/>
-              <a:t>Activities (Data Analysis // Database curation) store in ‘Team Project’ folder for this workshop’s repo.</a:t>
-            </a:r>
-          </a:p>
-          <a:p>
-            <a:pPr marL="971438" lvl="1" indent="-514350">
-              <a:buFont typeface="+mj-lt"/>
-              <a:buAutoNum type="arabicPeriod"/>
-            </a:pPr>
-            <a:r>
-              <a:rPr lang="en-CA" dirty="0">
-                <a:hlinkClick r:id="rId2"/>
-              </a:rPr>
-              <a:t>https://github.com/aosakwe/MiCM_IntroToGitHub</a:t>
-            </a:r>
-            <a:r>
-              <a:rPr lang="en-CA" dirty="0"/>
-              <a:t> </a:t>
-            </a:r>
-          </a:p>
-          <a:p>
-            <a:pPr marL="971438" lvl="1" indent="-514350">
-              <a:buFont typeface="+mj-lt"/>
-              <a:buAutoNum type="arabicPeriod"/>
-            </a:pPr>
-            <a:endParaRPr lang="en-CA" dirty="0"/>
-          </a:p>
-          <a:p>
-            <a:pPr marL="971438" lvl="1" indent="-514350">
-              <a:buFont typeface="+mj-lt"/>
-              <a:buAutoNum type="arabicPeriod"/>
-            </a:pPr>
-            <a:endParaRPr lang="en-CA" dirty="0"/>
+              <a:t>Task – as a team. Using the base files in the repo, create a fork and collaborate to extend it using pull requests.</a:t>
+            </a:r>
           </a:p>
           <a:p>
             <a:pPr marL="514350" indent="-514350">
               <a:buFont typeface="+mj-lt"/>
               <a:buAutoNum type="arabicPeriod"/>
             </a:pPr>
-            <a:r>
-              <a:rPr lang="en-CA" dirty="0"/>
-              <a:t>Task – as a team. Using the base files in the repo, create a fork and collaborate to extend it using pull requests.</a:t>
+            <a:endParaRPr lang="en-CA" dirty="0"/>
+          </a:p>
+          <a:p>
+            <a:pPr marL="0" indent="0">
+              <a:buNone/>
+            </a:pPr>
+            <a:r>
+              <a:rPr lang="en-CA" dirty="0"/>
+              <a:t>Ideas: Function to filter specific columns, plot specific columns etc.</a:t>
             </a:r>
           </a:p>
         </p:txBody>

</xml_diff>